<commit_message>
Folienmaster hat jetzt das richtige Datum
</commit_message>
<xml_diff>
--- a/Präsentation/Legosar_Master.pptx
+++ b/Präsentation/Legosar_Master.pptx
@@ -397,7 +397,7 @@
           <a:p>
             <a:fld id="{90BC4B87-6123-4AD5-BA18-D0C615F32DE0}" type="datetimeFigureOut">
               <a:rPr lang="de-DE" smtClean="0"/>
-              <a:t>04.07.2018</a:t>
+              <a:t>08.07.2018</a:t>
             </a:fld>
             <a:endParaRPr lang="de-DE"/>
           </a:p>
@@ -697,8 +697,8 @@
           <a:lstStyle/>
           <a:p>
             <a:r>
-              <a:rPr lang="de-DE" smtClean="0"/>
-              <a:t>14.07.2016</a:t>
+              <a:rPr lang="de-DE" dirty="0" smtClean="0"/>
+              <a:t>10.07.2018</a:t>
             </a:r>
             <a:endParaRPr lang="de-DE" dirty="0"/>
           </a:p>
@@ -970,8 +970,8 @@
           <a:lstStyle/>
           <a:p>
             <a:r>
-              <a:rPr lang="de-DE" smtClean="0"/>
-              <a:t>14.07.2016</a:t>
+              <a:rPr lang="de-DE" dirty="0" smtClean="0"/>
+              <a:t>10.07.2018</a:t>
             </a:r>
             <a:endParaRPr lang="de-DE" dirty="0"/>
           </a:p>
@@ -1100,8 +1100,8 @@
           <a:lstStyle/>
           <a:p>
             <a:r>
-              <a:rPr lang="de-DE" smtClean="0"/>
-              <a:t>14.07.2016</a:t>
+              <a:rPr lang="de-DE" dirty="0" smtClean="0"/>
+              <a:t>10.07.2018</a:t>
             </a:r>
             <a:endParaRPr lang="de-DE" dirty="0"/>
           </a:p>
@@ -1270,8 +1270,8 @@
           <a:lstStyle/>
           <a:p>
             <a:r>
-              <a:rPr lang="de-DE" smtClean="0"/>
-              <a:t>14.07.2016</a:t>
+              <a:rPr lang="de-DE" dirty="0" smtClean="0"/>
+              <a:t>10.07.2018</a:t>
             </a:r>
             <a:endParaRPr lang="de-DE" dirty="0"/>
           </a:p>
@@ -1460,8 +1460,8 @@
           <a:lstStyle/>
           <a:p>
             <a:r>
-              <a:rPr lang="de-DE" smtClean="0"/>
-              <a:t>14.07.2016</a:t>
+              <a:rPr lang="de-DE" dirty="0" smtClean="0"/>
+              <a:t>10.07.2018</a:t>
             </a:r>
             <a:endParaRPr lang="de-DE" dirty="0"/>
           </a:p>
@@ -1629,8 +1629,8 @@
           <a:lstStyle/>
           <a:p>
             <a:r>
-              <a:rPr lang="de-DE" smtClean="0"/>
-              <a:t>14.07.2016</a:t>
+              <a:rPr lang="de-DE" dirty="0" smtClean="0"/>
+              <a:t>10.07.2018</a:t>
             </a:r>
             <a:endParaRPr lang="de-DE" dirty="0"/>
           </a:p>
@@ -1897,8 +1897,8 @@
           <a:lstStyle/>
           <a:p>
             <a:r>
-              <a:rPr lang="de-DE" smtClean="0"/>
-              <a:t>14.07.2016</a:t>
+              <a:rPr lang="de-DE" dirty="0" smtClean="0"/>
+              <a:t>10.07.2018</a:t>
             </a:r>
             <a:endParaRPr lang="de-DE" dirty="0"/>
           </a:p>
@@ -2224,8 +2224,8 @@
           <a:lstStyle/>
           <a:p>
             <a:r>
-              <a:rPr lang="de-DE" smtClean="0"/>
-              <a:t>14.07.2016</a:t>
+              <a:rPr lang="de-DE" dirty="0" smtClean="0"/>
+              <a:t>10.07.2018</a:t>
             </a:r>
             <a:endParaRPr lang="de-DE" dirty="0"/>
           </a:p>
@@ -2551,8 +2551,8 @@
           <a:lstStyle/>
           <a:p>
             <a:r>
-              <a:rPr lang="de-DE" smtClean="0"/>
-              <a:t>14.07.2016</a:t>
+              <a:rPr lang="de-DE" dirty="0" smtClean="0"/>
+              <a:t>10.07.2018</a:t>
             </a:r>
             <a:endParaRPr lang="de-DE" dirty="0"/>
           </a:p>
@@ -2847,8 +2847,8 @@
           <a:lstStyle/>
           <a:p>
             <a:r>
-              <a:rPr lang="de-DE" smtClean="0"/>
-              <a:t>14.07.2016</a:t>
+              <a:rPr lang="de-DE" dirty="0" smtClean="0"/>
+              <a:t>10.07.2018</a:t>
             </a:r>
             <a:endParaRPr lang="de-DE" dirty="0"/>
           </a:p>
@@ -3104,8 +3104,8 @@
           <a:lstStyle/>
           <a:p>
             <a:r>
-              <a:rPr lang="de-DE" smtClean="0"/>
-              <a:t>14.07.2016</a:t>
+              <a:rPr lang="de-DE" dirty="0" smtClean="0"/>
+              <a:t>10.07.2018</a:t>
             </a:r>
             <a:endParaRPr lang="de-DE" dirty="0"/>
           </a:p>
@@ -3516,8 +3516,8 @@
           <a:lstStyle/>
           <a:p>
             <a:r>
-              <a:rPr lang="de-DE" smtClean="0"/>
-              <a:t>14.07.2016</a:t>
+              <a:rPr lang="de-DE" dirty="0" smtClean="0"/>
+              <a:t>10.07.2018</a:t>
             </a:r>
             <a:endParaRPr lang="de-DE" dirty="0"/>
           </a:p>
@@ -3763,8 +3763,8 @@
           <a:lstStyle/>
           <a:p>
             <a:r>
-              <a:rPr lang="de-DE" smtClean="0"/>
-              <a:t>14.07.2016</a:t>
+              <a:rPr lang="de-DE" dirty="0" smtClean="0"/>
+              <a:t>10.07.2018</a:t>
             </a:r>
             <a:endParaRPr lang="de-DE" dirty="0"/>
           </a:p>
@@ -4603,8 +4603,8 @@
           <a:lstStyle/>
           <a:p>
             <a:r>
-              <a:rPr lang="de-DE" smtClean="0"/>
-              <a:t>14.07.2016</a:t>
+              <a:rPr lang="de-DE" dirty="0" smtClean="0"/>
+              <a:t>10.07.2018</a:t>
             </a:r>
             <a:endParaRPr lang="de-DE" dirty="0"/>
           </a:p>
@@ -5268,8 +5268,8 @@
           <a:lstStyle/>
           <a:p>
             <a:r>
-              <a:rPr lang="de-DE" smtClean="0"/>
-              <a:t>14.07.2016</a:t>
+              <a:rPr lang="de-DE" dirty="0" smtClean="0"/>
+              <a:t>10.07.2018</a:t>
             </a:r>
             <a:endParaRPr lang="de-DE" dirty="0"/>
           </a:p>
@@ -5589,8 +5589,8 @@
           <a:lstStyle/>
           <a:p>
             <a:r>
-              <a:rPr lang="de-DE" smtClean="0"/>
-              <a:t>14.07.2016</a:t>
+              <a:rPr lang="de-DE" dirty="0" smtClean="0"/>
+              <a:t>10.07.2018</a:t>
             </a:r>
             <a:endParaRPr lang="de-DE" dirty="0"/>
           </a:p>
@@ -6032,8 +6032,8 @@
           </a:lstStyle>
           <a:p>
             <a:r>
-              <a:rPr lang="de-DE" smtClean="0"/>
-              <a:t>14.07.2016</a:t>
+              <a:rPr lang="de-DE" dirty="0" smtClean="0"/>
+              <a:t>10.07.2018</a:t>
             </a:r>
             <a:endParaRPr lang="de-DE" dirty="0"/>
           </a:p>
@@ -6600,8 +6600,8 @@
           <a:lstStyle/>
           <a:p>
             <a:r>
-              <a:rPr lang="de-DE" smtClean="0"/>
-              <a:t>14.07.2016</a:t>
+              <a:rPr lang="de-DE" dirty="0"/>
+              <a:t>10.07.2018</a:t>
             </a:r>
             <a:endParaRPr lang="de-DE" dirty="0"/>
           </a:p>
@@ -6786,8 +6786,8 @@
           <a:lstStyle/>
           <a:p>
             <a:r>
-              <a:rPr lang="de-DE" smtClean="0"/>
-              <a:t>14.07.2016</a:t>
+              <a:rPr lang="de-DE" dirty="0"/>
+              <a:t>10.07.2018</a:t>
             </a:r>
             <a:endParaRPr lang="de-DE" dirty="0"/>
           </a:p>
@@ -6990,8 +6990,8 @@
           <a:lstStyle/>
           <a:p>
             <a:r>
-              <a:rPr lang="de-DE" smtClean="0"/>
-              <a:t>14.07.2016</a:t>
+              <a:rPr lang="de-DE" dirty="0"/>
+              <a:t>10.07.2018</a:t>
             </a:r>
             <a:endParaRPr lang="de-DE" dirty="0"/>
           </a:p>
@@ -7947,21 +7947,6 @@
 </file>
 
 <file path=customXml/item1.xml><?xml version="1.0" encoding="utf-8"?>
-<?mso-contentType ?>
-<FormTemplates xmlns="http://schemas.microsoft.com/sharepoint/v3/contenttype/forms">
-  <Display>DocumentLibraryForm</Display>
-  <Edit>DocumentLibraryForm</Edit>
-  <New>DocumentLibraryForm</New>
-</FormTemplates>
-</file>
-
-<file path=customXml/item2.xml><?xml version="1.0" encoding="utf-8"?>
-<p:properties xmlns:p="http://schemas.microsoft.com/office/2006/metadata/properties" xmlns:xsi="http://www.w3.org/2001/XMLSchema-instance" xmlns:pc="http://schemas.microsoft.com/office/infopath/2007/PartnerControls">
-  <documentManagement/>
-</p:properties>
-</file>
-
-<file path=customXml/item3.xml><?xml version="1.0" encoding="utf-8"?>
 <ct:contentTypeSchema xmlns:ct="http://schemas.microsoft.com/office/2006/metadata/contentType" xmlns:ma="http://schemas.microsoft.com/office/2006/metadata/properties/metaAttributes" ct:_="" ma:_="" ma:contentTypeName="Dokument" ma:contentTypeID="0x0101003DC6390AE56B35438C65966F635EAD35" ma:contentTypeVersion="0" ma:contentTypeDescription="Ein neues Dokument erstellen." ma:contentTypeScope="" ma:versionID="4f3286d4674dd6d9e62b4ad622de0e43">
   <xsd:schema xmlns:xsd="http://www.w3.org/2001/XMLSchema" xmlns:xs="http://www.w3.org/2001/XMLSchema" xmlns:p="http://schemas.microsoft.com/office/2006/metadata/properties" targetNamespace="http://schemas.microsoft.com/office/2006/metadata/properties" ma:root="true" ma:fieldsID="b4f5dc90cf06628c3b90945c8266c24d">
     <xsd:element name="properties">
@@ -8075,10 +8060,33 @@
 </ct:contentTypeSchema>
 </file>
 
+<file path=customXml/item2.xml><?xml version="1.0" encoding="utf-8"?>
+<p:properties xmlns:p="http://schemas.microsoft.com/office/2006/metadata/properties" xmlns:xsi="http://www.w3.org/2001/XMLSchema-instance" xmlns:pc="http://schemas.microsoft.com/office/infopath/2007/PartnerControls">
+  <documentManagement/>
+</p:properties>
+</file>
+
+<file path=customXml/item3.xml><?xml version="1.0" encoding="utf-8"?>
+<?mso-contentType ?>
+<FormTemplates xmlns="http://schemas.microsoft.com/sharepoint/v3/contenttype/forms">
+  <Display>DocumentLibraryForm</Display>
+  <Edit>DocumentLibraryForm</Edit>
+  <New>DocumentLibraryForm</New>
+</FormTemplates>
+</file>
+
 <file path=customXml/itemProps1.xml><?xml version="1.0" encoding="utf-8"?>
-<ds:datastoreItem xmlns:ds="http://schemas.openxmlformats.org/officeDocument/2006/customXml" ds:itemID="{FD22786F-CBCD-4FD4-A284-6C8FA96D8FE2}">
+<ds:datastoreItem xmlns:ds="http://schemas.openxmlformats.org/officeDocument/2006/customXml" ds:itemID="{35240994-86D6-4C55-8272-3C86349FB6F7}">
   <ds:schemaRefs>
-    <ds:schemaRef ds:uri="http://schemas.microsoft.com/sharepoint/v3/contenttype/forms"/>
+    <ds:schemaRef ds:uri="http://schemas.microsoft.com/office/2006/metadata/contentType"/>
+    <ds:schemaRef ds:uri="http://schemas.microsoft.com/office/2006/metadata/properties/metaAttributes"/>
+    <ds:schemaRef ds:uri="http://www.w3.org/2001/XMLSchema"/>
+    <ds:schemaRef ds:uri="http://schemas.microsoft.com/office/2006/metadata/properties"/>
+    <ds:schemaRef ds:uri="http://schemas.openxmlformats.org/package/2006/metadata/core-properties"/>
+    <ds:schemaRef ds:uri="http://purl.org/dc/elements/1.1/"/>
+    <ds:schemaRef ds:uri="http://purl.org/dc/terms/"/>
+    <ds:schemaRef ds:uri="http://schemas.microsoft.com/internal/obd"/>
+    <ds:schemaRef ds:uri="http://schemas.microsoft.com/office/infopath/2007/PartnerControls"/>
   </ds:schemaRefs>
 </ds:datastoreItem>
 </file>
@@ -8099,17 +8107,9 @@
 </file>
 
 <file path=customXml/itemProps3.xml><?xml version="1.0" encoding="utf-8"?>
-<ds:datastoreItem xmlns:ds="http://schemas.openxmlformats.org/officeDocument/2006/customXml" ds:itemID="{35240994-86D6-4C55-8272-3C86349FB6F7}">
+<ds:datastoreItem xmlns:ds="http://schemas.openxmlformats.org/officeDocument/2006/customXml" ds:itemID="{FD22786F-CBCD-4FD4-A284-6C8FA96D8FE2}">
   <ds:schemaRefs>
-    <ds:schemaRef ds:uri="http://schemas.microsoft.com/office/2006/metadata/contentType"/>
-    <ds:schemaRef ds:uri="http://schemas.microsoft.com/office/2006/metadata/properties/metaAttributes"/>
-    <ds:schemaRef ds:uri="http://www.w3.org/2001/XMLSchema"/>
-    <ds:schemaRef ds:uri="http://schemas.microsoft.com/office/2006/metadata/properties"/>
-    <ds:schemaRef ds:uri="http://schemas.openxmlformats.org/package/2006/metadata/core-properties"/>
-    <ds:schemaRef ds:uri="http://purl.org/dc/elements/1.1/"/>
-    <ds:schemaRef ds:uri="http://purl.org/dc/terms/"/>
-    <ds:schemaRef ds:uri="http://schemas.microsoft.com/internal/obd"/>
-    <ds:schemaRef ds:uri="http://schemas.microsoft.com/office/infopath/2007/PartnerControls"/>
+    <ds:schemaRef ds:uri="http://schemas.microsoft.com/sharepoint/v3/contenttype/forms"/>
   </ds:schemaRefs>
 </ds:datastoreItem>
 </file>
</xml_diff>